<commit_message>
minor reformatting of font on one slide
</commit_message>
<xml_diff>
--- a/PowerPoints/06 - Syntax Analysis.pptx
+++ b/PowerPoints/06 - Syntax Analysis.pptx
@@ -14481,7 +14481,9 @@
               <a:t> also includes </a:t>
             </a:r>
             <a:r>
-              <a:rPr lang="en-US" u="sng" dirty="0"/>
+              <a:rPr lang="en-US" dirty="0">
+                <a:latin typeface="Consolas" panose="020B0609020204030204" pitchFamily="49" charset="0"/>
+              </a:rPr>
               <a:t>Follow(N)</a:t>
             </a:r>
             <a:r>

</xml_diff>

<commit_message>
minor corrections and edits to three slides
</commit_message>
<xml_diff>
--- a/PowerPoints/06 - Syntax Analysis.pptx
+++ b/PowerPoints/06 - Syntax Analysis.pptx
@@ -34,8 +34,8 @@
     <p:sldId id="373" r:id="rId22"/>
     <p:sldId id="345" r:id="rId23"/>
     <p:sldId id="339" r:id="rId24"/>
-    <p:sldId id="341" r:id="rId25"/>
-    <p:sldId id="342" r:id="rId26"/>
+    <p:sldId id="400" r:id="rId25"/>
+    <p:sldId id="401" r:id="rId26"/>
     <p:sldId id="346" r:id="rId27"/>
     <p:sldId id="347" r:id="rId28"/>
     <p:sldId id="385" r:id="rId29"/>
@@ -89,7 +89,7 @@
     <p:sldId id="399" r:id="rId77"/>
   </p:sldIdLst>
   <p:sldSz cx="9144000" cy="6858000" type="screen4x3"/>
-  <p:notesSz cx="7010400" cy="9296400"/>
+  <p:notesSz cx="7315200" cy="9601200"/>
   <p:defaultTextStyle>
     <a:defPPr>
       <a:defRPr lang="en-US"/>
@@ -232,12 +232,12 @@
     </p:ext>
     <p:ext uri="{2D200454-40CA-4A62-9FC3-DE9A4176ACB9}">
       <p15:notesGuideLst xmlns:p15="http://schemas.microsoft.com/office/powerpoint/2012/main">
-        <p15:guide id="1" orient="horz" pos="2928" userDrawn="1">
+        <p15:guide id="1" orient="horz" pos="3024" userDrawn="1">
           <p15:clr>
             <a:srgbClr val="A4A3A4"/>
           </p15:clr>
         </p15:guide>
-        <p15:guide id="2" pos="2208" userDrawn="1">
+        <p15:guide id="2" pos="2304" userDrawn="1">
           <p15:clr>
             <a:srgbClr val="A4A3A4"/>
           </p15:clr>
@@ -285,8 +285,8 @@
         </p:nvSpPr>
         <p:spPr bwMode="auto">
           <a:xfrm>
-            <a:off x="3971927" y="0"/>
-            <a:ext cx="3038475" cy="465138"/>
+            <a:off x="4144620" y="0"/>
+            <a:ext cx="3170583" cy="480388"/>
           </a:xfrm>
           <a:prstGeom prst="rect">
             <a:avLst/>
@@ -301,13 +301,13 @@
           <a:effectLst/>
         </p:spPr>
         <p:txBody>
-          <a:bodyPr vert="horz" wrap="square" lIns="93164" tIns="46582" rIns="93164" bIns="46582" numCol="1" anchor="t" anchorCtr="0" compatLnSpc="1">
+          <a:bodyPr vert="horz" wrap="square" lIns="96639" tIns="48320" rIns="96639" bIns="48320" numCol="1" anchor="t" anchorCtr="0" compatLnSpc="1">
             <a:prstTxWarp prst="textNoShape">
               <a:avLst/>
             </a:prstTxWarp>
           </a:bodyPr>
           <a:lstStyle>
-            <a:lvl1pPr algn="r" defTabSz="931726">
+            <a:lvl1pPr algn="r" defTabSz="966479">
               <a:defRPr sz="1200" smtClean="0"/>
             </a:lvl1pPr>
           </a:lstStyle>
@@ -336,8 +336,8 @@
         </p:nvSpPr>
         <p:spPr bwMode="auto">
           <a:xfrm>
-            <a:off x="3971927" y="8831265"/>
-            <a:ext cx="3038475" cy="465137"/>
+            <a:off x="4144620" y="9120815"/>
+            <a:ext cx="3170583" cy="480387"/>
           </a:xfrm>
           <a:prstGeom prst="rect">
             <a:avLst/>
@@ -352,13 +352,13 @@
           <a:effectLst/>
         </p:spPr>
         <p:txBody>
-          <a:bodyPr vert="horz" wrap="square" lIns="93164" tIns="46582" rIns="93164" bIns="46582" numCol="1" anchor="b" anchorCtr="0" compatLnSpc="1">
+          <a:bodyPr vert="horz" wrap="square" lIns="96639" tIns="48320" rIns="96639" bIns="48320" numCol="1" anchor="b" anchorCtr="0" compatLnSpc="1">
             <a:prstTxWarp prst="textNoShape">
               <a:avLst/>
             </a:prstTxWarp>
           </a:bodyPr>
           <a:lstStyle>
-            <a:lvl1pPr algn="r" defTabSz="931726">
+            <a:lvl1pPr algn="r" defTabSz="966479">
               <a:defRPr sz="1200" smtClean="0"/>
             </a:lvl1pPr>
           </a:lstStyle>
@@ -436,7 +436,7 @@
         <p:spPr bwMode="auto">
           <a:xfrm>
             <a:off x="2" y="0"/>
-            <a:ext cx="3038475" cy="465138"/>
+            <a:ext cx="3170583" cy="480388"/>
           </a:xfrm>
           <a:prstGeom prst="rect">
             <a:avLst/>
@@ -451,13 +451,13 @@
           <a:effectLst/>
         </p:spPr>
         <p:txBody>
-          <a:bodyPr vert="horz" wrap="square" lIns="93164" tIns="46582" rIns="93164" bIns="46582" numCol="1" anchor="t" anchorCtr="0" compatLnSpc="1">
+          <a:bodyPr vert="horz" wrap="square" lIns="96639" tIns="48320" rIns="96639" bIns="48320" numCol="1" anchor="t" anchorCtr="0" compatLnSpc="1">
             <a:prstTxWarp prst="textNoShape">
               <a:avLst/>
             </a:prstTxWarp>
           </a:bodyPr>
           <a:lstStyle>
-            <a:lvl1pPr algn="l" defTabSz="931726">
+            <a:lvl1pPr algn="l" defTabSz="966479">
               <a:defRPr sz="1200" smtClean="0"/>
             </a:lvl1pPr>
           </a:lstStyle>
@@ -484,8 +484,8 @@
         </p:nvSpPr>
         <p:spPr bwMode="auto">
           <a:xfrm>
-            <a:off x="3971927" y="0"/>
-            <a:ext cx="3038475" cy="465138"/>
+            <a:off x="4144620" y="0"/>
+            <a:ext cx="3170583" cy="480388"/>
           </a:xfrm>
           <a:prstGeom prst="rect">
             <a:avLst/>
@@ -500,13 +500,13 @@
           <a:effectLst/>
         </p:spPr>
         <p:txBody>
-          <a:bodyPr vert="horz" wrap="square" lIns="93164" tIns="46582" rIns="93164" bIns="46582" numCol="1" anchor="t" anchorCtr="0" compatLnSpc="1">
+          <a:bodyPr vert="horz" wrap="square" lIns="96639" tIns="48320" rIns="96639" bIns="48320" numCol="1" anchor="t" anchorCtr="0" compatLnSpc="1">
             <a:prstTxWarp prst="textNoShape">
               <a:avLst/>
             </a:prstTxWarp>
           </a:bodyPr>
           <a:lstStyle>
-            <a:lvl1pPr algn="r" defTabSz="931726">
+            <a:lvl1pPr algn="r" defTabSz="966479">
               <a:defRPr sz="1200" smtClean="0"/>
             </a:lvl1pPr>
           </a:lstStyle>
@@ -530,8 +530,8 @@
         </p:nvSpPr>
         <p:spPr bwMode="auto">
           <a:xfrm>
-            <a:off x="1181100" y="696913"/>
-            <a:ext cx="4648200" cy="3486150"/>
+            <a:off x="1257300" y="719138"/>
+            <a:ext cx="4800600" cy="3600450"/>
           </a:xfrm>
           <a:prstGeom prst="rect">
             <a:avLst/>
@@ -559,8 +559,8 @@
         </p:nvSpPr>
         <p:spPr bwMode="auto">
           <a:xfrm>
-            <a:off x="935040" y="4416427"/>
-            <a:ext cx="5140325" cy="4183063"/>
+            <a:off x="975695" y="4561228"/>
+            <a:ext cx="5363817" cy="4320213"/>
           </a:xfrm>
           <a:prstGeom prst="rect">
             <a:avLst/>
@@ -575,7 +575,7 @@
           <a:effectLst/>
         </p:spPr>
         <p:txBody>
-          <a:bodyPr vert="horz" wrap="square" lIns="93164" tIns="46582" rIns="93164" bIns="46582" numCol="1" anchor="t" anchorCtr="0" compatLnSpc="1">
+          <a:bodyPr vert="horz" wrap="square" lIns="96639" tIns="48320" rIns="96639" bIns="48320" numCol="1" anchor="t" anchorCtr="0" compatLnSpc="1">
             <a:prstTxWarp prst="textNoShape">
               <a:avLst/>
             </a:prstTxWarp>
@@ -630,8 +630,8 @@
         </p:nvSpPr>
         <p:spPr bwMode="auto">
           <a:xfrm>
-            <a:off x="2" y="8831265"/>
-            <a:ext cx="3038475" cy="465137"/>
+            <a:off x="2" y="9120815"/>
+            <a:ext cx="3170583" cy="480387"/>
           </a:xfrm>
           <a:prstGeom prst="rect">
             <a:avLst/>
@@ -646,13 +646,13 @@
           <a:effectLst/>
         </p:spPr>
         <p:txBody>
-          <a:bodyPr vert="horz" wrap="square" lIns="93164" tIns="46582" rIns="93164" bIns="46582" numCol="1" anchor="b" anchorCtr="0" compatLnSpc="1">
+          <a:bodyPr vert="horz" wrap="square" lIns="96639" tIns="48320" rIns="96639" bIns="48320" numCol="1" anchor="b" anchorCtr="0" compatLnSpc="1">
             <a:prstTxWarp prst="textNoShape">
               <a:avLst/>
             </a:prstTxWarp>
           </a:bodyPr>
           <a:lstStyle>
-            <a:lvl1pPr algn="l" defTabSz="931726">
+            <a:lvl1pPr algn="l" defTabSz="966479">
               <a:defRPr sz="1200" smtClean="0"/>
             </a:lvl1pPr>
           </a:lstStyle>
@@ -676,8 +676,8 @@
         </p:nvSpPr>
         <p:spPr bwMode="auto">
           <a:xfrm>
-            <a:off x="3971927" y="8831265"/>
-            <a:ext cx="3038475" cy="465137"/>
+            <a:off x="4144620" y="9120815"/>
+            <a:ext cx="3170583" cy="480387"/>
           </a:xfrm>
           <a:prstGeom prst="rect">
             <a:avLst/>
@@ -692,13 +692,13 @@
           <a:effectLst/>
         </p:spPr>
         <p:txBody>
-          <a:bodyPr vert="horz" wrap="square" lIns="93164" tIns="46582" rIns="93164" bIns="46582" numCol="1" anchor="b" anchorCtr="0" compatLnSpc="1">
+          <a:bodyPr vert="horz" wrap="square" lIns="96639" tIns="48320" rIns="96639" bIns="48320" numCol="1" anchor="b" anchorCtr="0" compatLnSpc="1">
             <a:prstTxWarp prst="textNoShape">
               <a:avLst/>
             </a:prstTxWarp>
           </a:bodyPr>
           <a:lstStyle>
-            <a:lvl1pPr algn="r" defTabSz="931726">
+            <a:lvl1pPr algn="r" defTabSz="966479">
               <a:defRPr sz="1200" smtClean="0"/>
             </a:lvl1pPr>
           </a:lstStyle>
@@ -5248,7 +5248,7 @@
           <a:bodyPr/>
           <a:lstStyle/>
           <a:p>
-            <a:pPr defTabSz="930138"/>
+            <a:pPr defTabSz="964832"/>
             <a:r>
               <a:rPr lang="en-US"/>
               <a:t>Subprograms</a:t>
@@ -5273,10 +5273,10 @@
           <a:bodyPr/>
           <a:lstStyle/>
           <a:p>
-            <a:pPr defTabSz="930138"/>
+            <a:pPr defTabSz="964832"/>
             <a:fld id="{F7624EB1-F083-4E77-9F78-569C6646FEF6}" type="slidenum">
               <a:rPr lang="en-US" smtClean="0"/>
-              <a:pPr defTabSz="930138"/>
+              <a:pPr defTabSz="964832"/>
               <a:t>52</a:t>
             </a:fld>
             <a:endParaRPr lang="en-US"/>
@@ -5366,7 +5366,7 @@
           <a:bodyPr/>
           <a:lstStyle/>
           <a:p>
-            <a:pPr defTabSz="930138"/>
+            <a:pPr defTabSz="964832"/>
             <a:r>
               <a:rPr lang="en-US"/>
               <a:t>Subprograms</a:t>
@@ -5391,10 +5391,10 @@
           <a:bodyPr/>
           <a:lstStyle/>
           <a:p>
-            <a:pPr defTabSz="930138"/>
+            <a:pPr defTabSz="964832"/>
             <a:fld id="{F7624EB1-F083-4E77-9F78-569C6646FEF6}" type="slidenum">
               <a:rPr lang="en-US" smtClean="0"/>
-              <a:pPr defTabSz="930138"/>
+              <a:pPr defTabSz="964832"/>
               <a:t>53</a:t>
             </a:fld>
             <a:endParaRPr lang="en-US"/>
@@ -5599,7 +5599,7 @@
           <a:bodyPr/>
           <a:lstStyle/>
           <a:p>
-            <a:pPr defTabSz="930138"/>
+            <a:pPr defTabSz="964832"/>
             <a:r>
               <a:rPr lang="en-US"/>
               <a:t>Subprograms</a:t>
@@ -5624,10 +5624,10 @@
           <a:bodyPr/>
           <a:lstStyle/>
           <a:p>
-            <a:pPr defTabSz="930138"/>
+            <a:pPr defTabSz="964832"/>
             <a:fld id="{D92411FA-7305-4EA7-A40B-F5D90476B901}" type="slidenum">
               <a:rPr lang="en-US" smtClean="0"/>
-              <a:pPr defTabSz="930138"/>
+              <a:pPr defTabSz="964832"/>
               <a:t>56</a:t>
             </a:fld>
             <a:endParaRPr lang="en-US"/>
@@ -5717,7 +5717,7 @@
           <a:bodyPr/>
           <a:lstStyle/>
           <a:p>
-            <a:pPr defTabSz="930138"/>
+            <a:pPr defTabSz="964832"/>
             <a:r>
               <a:rPr lang="en-US"/>
               <a:t>Subprograms</a:t>
@@ -5742,10 +5742,10 @@
           <a:bodyPr/>
           <a:lstStyle/>
           <a:p>
-            <a:pPr defTabSz="930138"/>
+            <a:pPr defTabSz="964832"/>
             <a:fld id="{D92411FA-7305-4EA7-A40B-F5D90476B901}" type="slidenum">
               <a:rPr lang="en-US" smtClean="0"/>
-              <a:pPr defTabSz="930138"/>
+              <a:pPr defTabSz="964832"/>
               <a:t>57</a:t>
             </a:fld>
             <a:endParaRPr lang="en-US"/>
@@ -5952,7 +5952,7 @@
           <a:bodyPr/>
           <a:lstStyle/>
           <a:p>
-            <a:pPr defTabSz="930138"/>
+            <a:pPr defTabSz="964832"/>
             <a:r>
               <a:rPr lang="en-US"/>
               <a:t>Subprograms</a:t>
@@ -5977,10 +5977,10 @@
           <a:bodyPr/>
           <a:lstStyle/>
           <a:p>
-            <a:pPr defTabSz="930138"/>
+            <a:pPr defTabSz="964832"/>
             <a:fld id="{E4963487-933C-4DBA-A7C2-D88BC4B3A77E}" type="slidenum">
               <a:rPr lang="en-US" smtClean="0"/>
-              <a:pPr defTabSz="930138"/>
+              <a:pPr defTabSz="964832"/>
               <a:t>59</a:t>
             </a:fld>
             <a:endParaRPr lang="en-US"/>
@@ -6196,7 +6196,7 @@
           <a:bodyPr/>
           <a:lstStyle/>
           <a:p>
-            <a:pPr defTabSz="930138"/>
+            <a:pPr defTabSz="964832"/>
             <a:r>
               <a:rPr lang="en-US"/>
               <a:t>Subprograms</a:t>
@@ -6221,10 +6221,10 @@
           <a:bodyPr/>
           <a:lstStyle/>
           <a:p>
-            <a:pPr defTabSz="930138"/>
+            <a:pPr defTabSz="964832"/>
             <a:fld id="{E4963487-933C-4DBA-A7C2-D88BC4B3A77E}" type="slidenum">
               <a:rPr lang="en-US" smtClean="0"/>
-              <a:pPr defTabSz="930138"/>
+              <a:pPr defTabSz="964832"/>
               <a:t>60</a:t>
             </a:fld>
             <a:endParaRPr lang="en-US"/>
@@ -6314,7 +6314,7 @@
           <a:bodyPr/>
           <a:lstStyle/>
           <a:p>
-            <a:pPr defTabSz="930138"/>
+            <a:pPr defTabSz="964832"/>
             <a:r>
               <a:rPr lang="en-US"/>
               <a:t>Subprograms</a:t>
@@ -6339,10 +6339,10 @@
           <a:bodyPr/>
           <a:lstStyle/>
           <a:p>
-            <a:pPr defTabSz="930138"/>
+            <a:pPr defTabSz="964832"/>
             <a:fld id="{E4963487-933C-4DBA-A7C2-D88BC4B3A77E}" type="slidenum">
               <a:rPr lang="en-US" smtClean="0"/>
-              <a:pPr defTabSz="930138"/>
+              <a:pPr defTabSz="964832"/>
               <a:t>61</a:t>
             </a:fld>
             <a:endParaRPr lang="en-US"/>
@@ -12169,6 +12169,68 @@
           </a:p>
         </p:txBody>
       </p:sp>
+      <p:sp>
+        <p:nvSpPr>
+          <p:cNvPr id="2" name="TextBox 1">
+            <a:extLst>
+              <a:ext uri="{FF2B5EF4-FFF2-40B4-BE49-F238E27FC236}">
+                <a16:creationId xmlns:a16="http://schemas.microsoft.com/office/drawing/2014/main" id="{934EE5EE-765C-EEA0-0C72-F050BF27EDA5}"/>
+              </a:ext>
+            </a:extLst>
+          </p:cNvPr>
+          <p:cNvSpPr txBox="1"/>
+          <p:nvPr/>
+        </p:nvSpPr>
+        <p:spPr>
+          <a:xfrm>
+            <a:off x="1201526" y="3505200"/>
+            <a:ext cx="6740948" cy="1569660"/>
+          </a:xfrm>
+          <a:prstGeom prst="rect">
+            <a:avLst/>
+          </a:prstGeom>
+          <a:noFill/>
+          <a:ln>
+            <a:solidFill>
+              <a:schemeClr val="tx1"/>
+            </a:solidFill>
+          </a:ln>
+        </p:spPr>
+        <p:txBody>
+          <a:bodyPr wrap="none" rtlCol="0">
+            <a:spAutoFit/>
+          </a:bodyPr>
+          <a:lstStyle/>
+          <a:p>
+            <a:pPr algn="l"/>
+            <a:r>
+              <a:rPr lang="en-US" dirty="0"/>
+              <a:t>The examples that follow use braces “{” and “}” </a:t>
+            </a:r>
+          </a:p>
+          <a:p>
+            <a:pPr algn="l"/>
+            <a:r>
+              <a:rPr lang="en-US" dirty="0"/>
+              <a:t>both as set notation to indicate membership and</a:t>
+            </a:r>
+          </a:p>
+          <a:p>
+            <a:pPr algn="l"/>
+            <a:r>
+              <a:rPr lang="en-US" dirty="0"/>
+              <a:t>as grammar notation to indicate zero or more.  </a:t>
+            </a:r>
+          </a:p>
+          <a:p>
+            <a:pPr algn="l"/>
+            <a:r>
+              <a:rPr lang="en-US" dirty="0"/>
+              <a:t>The meaning should be clear from the context.</a:t>
+            </a:r>
+          </a:p>
+        </p:txBody>
+      </p:sp>
     </p:spTree>
   </p:cSld>
   <p:clrMapOvr>
@@ -12690,7 +12752,7 @@
               <a:rPr lang="en-US" sz="2000" dirty="0" err="1">
                 <a:latin typeface="Consolas" panose="020B0609020204030204" pitchFamily="49" charset="0"/>
               </a:rPr>
-              <a:t>arrayTypeDecl</a:t>
+              <a:t>typeDecl</a:t>
             </a:r>
             <a:r>
               <a:rPr lang="en-US" sz="2000" dirty="0">
@@ -12708,13 +12770,7 @@
               <a:rPr lang="en-US" sz="2000" dirty="0">
                 <a:latin typeface="Consolas" panose="020B0609020204030204" pitchFamily="49" charset="0"/>
               </a:rPr>
-              <a:t> "=" ( </a:t>
-            </a:r>
-            <a:r>
-              <a:rPr lang="en-US" sz="2000" dirty="0" err="1">
-                <a:latin typeface="Consolas" panose="020B0609020204030204" pitchFamily="49" charset="0"/>
-              </a:rPr>
-              <a:t>arrayTypeDecl</a:t>
+              <a:t> "="</a:t>
             </a:r>
             <a:br>
               <a:rPr lang="en-US" sz="2000" dirty="0">
@@ -12725,7 +12781,19 @@
               <a:rPr lang="en-US" sz="2000" dirty="0">
                 <a:latin typeface="Consolas" panose="020B0609020204030204" pitchFamily="49" charset="0"/>
               </a:rPr>
-              <a:t>           | </a:t>
+              <a:t>    ( </a:t>
+            </a:r>
+            <a:r>
+              <a:rPr lang="en-US" sz="2000" dirty="0" err="1">
+                <a:latin typeface="Consolas" panose="020B0609020204030204" pitchFamily="49" charset="0"/>
+              </a:rPr>
+              <a:t>arrayTypeDecl</a:t>
+            </a:r>
+            <a:r>
+              <a:rPr lang="en-US" sz="2000" dirty="0">
+                <a:latin typeface="Consolas" panose="020B0609020204030204" pitchFamily="49" charset="0"/>
+              </a:rPr>
+              <a:t> | </a:t>
             </a:r>
             <a:r>
               <a:rPr lang="en-US" sz="2000" dirty="0" err="1">
@@ -12766,7 +12834,7 @@
               <a:rPr lang="en-US" sz="2000" dirty="0" err="1">
                 <a:latin typeface="Consolas" panose="020B0609020204030204" pitchFamily="49" charset="0"/>
               </a:rPr>
-              <a:t>arrayTypeDecl</a:t>
+              <a:t>typeDecl</a:t>
             </a:r>
             <a:r>
               <a:rPr lang="en-US" sz="2000" dirty="0">
@@ -13189,7 +13257,7 @@
               <a:rPr lang="en-US" sz="2200" dirty="0">
                 <a:latin typeface="Consolas" panose="020B0609020204030204" pitchFamily="49" charset="0"/>
               </a:rPr>
-              <a:t>First(E) ∪ First(F) ⊆ First([E] F)</a:t>
+              <a:t>First(E) ∪ First(F) ⊆ First({E} F)</a:t>
             </a:r>
             <a:r>
               <a:rPr lang="en-US" sz="2200" dirty="0"/>
@@ -13983,7 +14051,7 @@
     </p:spTree>
     <p:extLst>
       <p:ext uri="{BB962C8B-B14F-4D97-AF65-F5344CB8AC3E}">
-        <p14:creationId xmlns:p14="http://schemas.microsoft.com/office/powerpoint/2010/main" val="3071633791"/>
+        <p14:creationId xmlns:p14="http://schemas.microsoft.com/office/powerpoint/2010/main" val="664005165"/>
       </p:ext>
     </p:extLst>
   </p:cSld>
@@ -14294,7 +14362,7 @@
     </p:spTree>
     <p:extLst>
       <p:ext uri="{BB962C8B-B14F-4D97-AF65-F5344CB8AC3E}">
-        <p14:creationId xmlns:p14="http://schemas.microsoft.com/office/powerpoint/2010/main" val="3530960666"/>
+        <p14:creationId xmlns:p14="http://schemas.microsoft.com/office/powerpoint/2010/main" val="1774830597"/>
       </p:ext>
     </p:extLst>
   </p:cSld>
@@ -21028,11 +21096,14 @@
                 <a:defRPr/>
               </a:pPr>
               <a:r>
-                <a:rPr lang="en-US" sz="1800" kern="0" dirty="0">
+                <a:rPr lang="en-US" sz="1800" kern="0" dirty="0" err="1">
                   <a:latin typeface="Arial" charset="0"/>
                 </a:rPr>
                 <a:t>subprogramDecls</a:t>
               </a:r>
+              <a:endParaRPr lang="en-US" sz="1800" kern="0" dirty="0">
+                <a:latin typeface="Arial" charset="0"/>
+              </a:endParaRPr>
             </a:p>
           </p:txBody>
         </p:sp>
@@ -27493,7 +27564,19 @@
               <a:rPr lang="en-US" dirty="0">
                 <a:latin typeface="Consolas" panose="020B0609020204030204" pitchFamily="49" charset="0"/>
               </a:rPr>
-              <a:t>public IdType get(String </a:t>
+              <a:t>public IdType get(</a:t>
+            </a:r>
+            <a:r>
+              <a:rPr lang="en-US" dirty="0" err="1">
+                <a:latin typeface="Consolas" panose="020B0609020204030204" pitchFamily="49" charset="0"/>
+              </a:rPr>
+              <a:t>Strine</a:t>
+            </a:r>
+            <a:r>
+              <a:rPr lang="en-US" dirty="0">
+                <a:latin typeface="Consolas" panose="020B0609020204030204" pitchFamily="49" charset="0"/>
+              </a:rPr>
+              <a:t> </a:t>
             </a:r>
             <a:r>
               <a:rPr lang="en-US" dirty="0" err="1">

</xml_diff>

<commit_message>
minor edits to a couple of slides
</commit_message>
<xml_diff>
--- a/PowerPoints/06 - Syntax Analysis.pptx
+++ b/PowerPoints/06 - Syntax Analysis.pptx
@@ -20199,7 +20199,7 @@
           <a:p>
             <a:r>
               <a:rPr lang="en-US" sz="2350" dirty="0"/>
-              <a:t>In practice, the syntax of most programming languages can be defined, or at least closely approximated, by an LL(1) grammar</a:t>
+              <a:t>In practice, the syntax of most programming languages can be defined, or at least closely approximated, by an LL(k) grammar</a:t>
             </a:r>
           </a:p>
           <a:p>
@@ -20447,8 +20447,8 @@
         </p:nvSpPr>
         <p:spPr>
           <a:xfrm>
-            <a:off x="458788" y="1363663"/>
-            <a:ext cx="8226425" cy="4935537"/>
+            <a:off x="458787" y="1363663"/>
+            <a:ext cx="8321040" cy="4935537"/>
           </a:xfrm>
         </p:spPr>
         <p:txBody>
@@ -20465,16 +20465,50 @@
               <a:buNone/>
             </a:pPr>
             <a:r>
+              <a:rPr lang="en-US" sz="1800" dirty="0">
+                <a:latin typeface="Consolas" panose="020B0609020204030204" pitchFamily="49" charset="0"/>
+              </a:rPr>
+              <a:t>parseLoopStmt()         // called when parsing the outer loop</a:t>
+            </a:r>
+          </a:p>
+          <a:p>
+            <a:pPr marL="457200" lvl="1" indent="0">
+              <a:spcBef>
+                <a:spcPts val="100"/>
+              </a:spcBef>
+              <a:buNone/>
+            </a:pPr>
+            <a:r>
+              <a:rPr lang="en-US" sz="1800" dirty="0">
+                <a:latin typeface="Consolas" panose="020B0609020204030204" pitchFamily="49" charset="0"/>
+              </a:rPr>
+              <a:t>   ...</a:t>
+            </a:r>
+          </a:p>
+          <a:p>
+            <a:pPr marL="457200" lvl="1" indent="0">
+              <a:spcBef>
+                <a:spcPts val="100"/>
+              </a:spcBef>
+              <a:buNone/>
+            </a:pPr>
+            <a:r>
+              <a:rPr lang="en-US" sz="1800" dirty="0">
+                <a:latin typeface="Consolas" panose="020B0609020204030204" pitchFamily="49" charset="0"/>
+              </a:rPr>
+              <a:t>   </a:t>
+            </a:r>
+            <a:r>
               <a:rPr lang="en-US" sz="1800" dirty="0" err="1">
                 <a:latin typeface="Consolas" panose="020B0609020204030204" pitchFamily="49" charset="0"/>
               </a:rPr>
-              <a:t>parseLoop</a:t>
-            </a:r>
-            <a:r>
-              <a:rPr lang="en-US" sz="1800" dirty="0">
-                <a:latin typeface="Consolas" panose="020B0609020204030204" pitchFamily="49" charset="0"/>
-              </a:rPr>
-              <a:t>()         // called when parsing the outer loop</a:t>
+              <a:t>parseCompoundStmt</a:t>
+            </a:r>
+            <a:r>
+              <a:rPr lang="en-US" sz="1800" dirty="0">
+                <a:latin typeface="Consolas" panose="020B0609020204030204" pitchFamily="49" charset="0"/>
+              </a:rPr>
+              <a:t>()</a:t>
             </a:r>
           </a:p>
           <a:p>
@@ -20488,7 +20522,7 @@
               <a:rPr lang="en-US" sz="1800" dirty="0">
                 <a:latin typeface="Consolas" panose="020B0609020204030204" pitchFamily="49" charset="0"/>
               </a:rPr>
-              <a:t>   ...</a:t>
+              <a:t>      ...</a:t>
             </a:r>
           </a:p>
           <a:p>
@@ -20502,59 +20536,19 @@
               <a:rPr lang="en-US" sz="1800" dirty="0">
                 <a:latin typeface="Consolas" panose="020B0609020204030204" pitchFamily="49" charset="0"/>
               </a:rPr>
-              <a:t>   </a:t>
-            </a:r>
-            <a:r>
-              <a:rPr lang="en-US" sz="1800" dirty="0" err="1">
-                <a:latin typeface="Consolas" panose="020B0609020204030204" pitchFamily="49" charset="0"/>
-              </a:rPr>
-              <a:t>parseCompoundStmt</a:t>
-            </a:r>
-            <a:r>
-              <a:rPr lang="en-US" sz="1800" dirty="0">
-                <a:latin typeface="Consolas" panose="020B0609020204030204" pitchFamily="49" charset="0"/>
-              </a:rPr>
-              <a:t>()</a:t>
-            </a:r>
-          </a:p>
-          <a:p>
-            <a:pPr marL="457200" lvl="1" indent="0">
-              <a:spcBef>
-                <a:spcPts val="100"/>
-              </a:spcBef>
-              <a:buNone/>
-            </a:pPr>
-            <a:r>
-              <a:rPr lang="en-US" sz="1800" dirty="0">
-                <a:latin typeface="Consolas" panose="020B0609020204030204" pitchFamily="49" charset="0"/>
-              </a:rPr>
-              <a:t>      ...</a:t>
-            </a:r>
-          </a:p>
-          <a:p>
-            <a:pPr marL="457200" lvl="1" indent="0">
-              <a:spcBef>
-                <a:spcPts val="100"/>
-              </a:spcBef>
-              <a:buNone/>
-            </a:pPr>
-            <a:r>
-              <a:rPr lang="en-US" sz="1800" dirty="0">
-                <a:latin typeface="Consolas" panose="020B0609020204030204" pitchFamily="49" charset="0"/>
-              </a:rPr>
-              <a:t>      </a:t>
-            </a:r>
-            <a:r>
-              <a:rPr lang="en-US" sz="1800" dirty="0" err="1">
-                <a:latin typeface="Consolas" panose="020B0609020204030204" pitchFamily="49" charset="0"/>
-              </a:rPr>
-              <a:t>parseLoop</a:t>
-            </a:r>
-            <a:r>
-              <a:rPr lang="en-US" sz="1800" dirty="0">
-                <a:latin typeface="Consolas" panose="020B0609020204030204" pitchFamily="49" charset="0"/>
-              </a:rPr>
-              <a:t>()   // called when paring the inner loop</a:t>
+              <a:t>      parseLoopStmt()   // called </a:t>
+            </a:r>
+            <a:r>
+              <a:rPr lang="en-US" sz="1800">
+                <a:latin typeface="Consolas" panose="020B0609020204030204" pitchFamily="49" charset="0"/>
+              </a:rPr>
+              <a:t>when parsing </a:t>
+            </a:r>
+            <a:r>
+              <a:rPr lang="en-US" sz="1800" dirty="0">
+                <a:latin typeface="Consolas" panose="020B0609020204030204" pitchFamily="49" charset="0"/>
+              </a:rPr>
+              <a:t>the inner loop</a:t>
             </a:r>
           </a:p>
           <a:p>

</xml_diff>

<commit_message>
minor changes to 1 slide
</commit_message>
<xml_diff>
--- a/PowerPoints/06 - Syntax Analysis.pptx
+++ b/PowerPoints/06 - Syntax Analysis.pptx
@@ -34185,10 +34185,16 @@
               <a:t>paramId</a:t>
             </a:r>
             <a:r>
-              <a:rPr lang="en-US" sz="1800" dirty="0">
-                <a:latin typeface="Consolas" panose="020B0609020204030204" pitchFamily="49" charset="0"/>
-              </a:rPr>
-              <a:t>) { </a:t>
+              <a:rPr lang="en-US" sz="1800">
+                <a:latin typeface="Consolas" panose="020B0609020204030204" pitchFamily="49" charset="0"/>
+              </a:rPr>
+              <a:t> ) </a:t>
+            </a:r>
+            <a:r>
+              <a:rPr lang="en-US" sz="1800" dirty="0">
+                <a:latin typeface="Consolas" panose="020B0609020204030204" pitchFamily="49" charset="0"/>
+              </a:rPr>
+              <a:t>{ </a:t>
             </a:r>
             <a:r>
               <a:rPr lang="en-US" sz="1800" dirty="0" err="1">

</xml_diff>

<commit_message>
updates to one slide
</commit_message>
<xml_diff>
--- a/PowerPoints/06 - Syntax Analysis.pptx
+++ b/PowerPoints/06 - Syntax Analysis.pptx
@@ -35222,7 +35222,7 @@
               <a:rPr lang="en-US" dirty="0" err="1">
                 <a:latin typeface="Consolas" panose="020B0609020204030204" pitchFamily="49" charset="0"/>
               </a:rPr>
-              <a:t>parseVariableExpr</a:t>
+              <a:t>parseVariableCommon</a:t>
             </a:r>
             <a:r>
               <a:rPr lang="en-US" dirty="0">
@@ -35271,7 +35271,19 @@
               <a:rPr lang="en-US" sz="1800" dirty="0">
                 <a:latin typeface="Consolas" panose="020B0609020204030204" pitchFamily="49" charset="0"/>
               </a:rPr>
-              <a:t>    while (scanner.getSymbol().</a:t>
+              <a:t>    while (</a:t>
+            </a:r>
+            <a:r>
+              <a:rPr lang="en-US" sz="1800" dirty="0" err="1">
+                <a:latin typeface="Consolas" panose="020B0609020204030204" pitchFamily="49" charset="0"/>
+              </a:rPr>
+              <a:t>scanner.getSymbol</a:t>
+            </a:r>
+            <a:r>
+              <a:rPr lang="en-US" sz="1800" dirty="0">
+                <a:latin typeface="Consolas" panose="020B0609020204030204" pitchFamily="49" charset="0"/>
+              </a:rPr>
+              <a:t>().</a:t>
             </a:r>
             <a:r>
               <a:rPr lang="en-US" sz="1800" dirty="0" err="1">
@@ -35311,7 +35323,19 @@
               <a:rPr lang="en-US" sz="1800" dirty="0">
                 <a:latin typeface="Consolas" panose="020B0609020204030204" pitchFamily="49" charset="0"/>
               </a:rPr>
-              <a:t>        if (scanner.getSymbol() == </a:t>
+              <a:t>        if (</a:t>
+            </a:r>
+            <a:r>
+              <a:rPr lang="en-US" sz="1800" dirty="0" err="1">
+                <a:latin typeface="Consolas" panose="020B0609020204030204" pitchFamily="49" charset="0"/>
+              </a:rPr>
+              <a:t>scanner.getSymbol</a:t>
+            </a:r>
+            <a:r>
+              <a:rPr lang="en-US" sz="1800" dirty="0">
+                <a:latin typeface="Consolas" panose="020B0609020204030204" pitchFamily="49" charset="0"/>
+              </a:rPr>
+              <a:t>() == </a:t>
             </a:r>
             <a:r>
               <a:rPr lang="en-US" sz="1800" dirty="0" err="1">
@@ -35337,19 +35361,7 @@
               <a:rPr lang="en-US" sz="1800" dirty="0">
                 <a:latin typeface="Consolas" panose="020B0609020204030204" pitchFamily="49" charset="0"/>
               </a:rPr>
-              <a:t>            </a:t>
-            </a:r>
-            <a:r>
-              <a:rPr lang="en-US" sz="1800" dirty="0" err="1">
-                <a:latin typeface="Consolas" panose="020B0609020204030204" pitchFamily="49" charset="0"/>
-              </a:rPr>
-              <a:t>parseIndexExpr</a:t>
-            </a:r>
-            <a:r>
-              <a:rPr lang="en-US" sz="1800" dirty="0">
-                <a:latin typeface="Consolas" panose="020B0609020204030204" pitchFamily="49" charset="0"/>
-              </a:rPr>
-              <a:t>();</a:t>
+              <a:t>          {</a:t>
             </a:r>
           </a:p>
           <a:p>
@@ -35363,7 +35375,19 @@
               <a:rPr lang="en-US" sz="1800" dirty="0">
                 <a:latin typeface="Consolas" panose="020B0609020204030204" pitchFamily="49" charset="0"/>
               </a:rPr>
-              <a:t>        else if (scanner.getSymbol() == Symbol.dot)</a:t>
+              <a:t>            match(</a:t>
+            </a:r>
+            <a:r>
+              <a:rPr lang="en-US" sz="1800" dirty="0" err="1">
+                <a:latin typeface="Consolas" panose="020B0609020204030204" pitchFamily="49" charset="0"/>
+              </a:rPr>
+              <a:t>Symbol.leftBracket</a:t>
+            </a:r>
+            <a:r>
+              <a:rPr lang="en-US" sz="1800" dirty="0">
+                <a:latin typeface="Consolas" panose="020B0609020204030204" pitchFamily="49" charset="0"/>
+              </a:rPr>
+              <a:t>);</a:t>
             </a:r>
           </a:p>
           <a:p>
@@ -35383,13 +35407,147 @@
               <a:rPr lang="en-US" sz="1800" dirty="0" err="1">
                 <a:latin typeface="Consolas" panose="020B0609020204030204" pitchFamily="49" charset="0"/>
               </a:rPr>
-              <a:t>parseFieldExpr</a:t>
+              <a:t>parseExpression</a:t>
             </a:r>
             <a:r>
               <a:rPr lang="en-US" sz="1800" dirty="0">
                 <a:latin typeface="Consolas" panose="020B0609020204030204" pitchFamily="49" charset="0"/>
               </a:rPr>
               <a:t>();</a:t>
+            </a:r>
+          </a:p>
+          <a:p>
+            <a:pPr marL="91440" indent="0">
+              <a:spcBef>
+                <a:spcPts val="100"/>
+              </a:spcBef>
+              <a:buNone/>
+            </a:pPr>
+            <a:r>
+              <a:rPr lang="en-US" sz="1800" dirty="0">
+                <a:latin typeface="Consolas" panose="020B0609020204030204" pitchFamily="49" charset="0"/>
+              </a:rPr>
+              <a:t>            match(</a:t>
+            </a:r>
+            <a:r>
+              <a:rPr lang="en-US" sz="1800" dirty="0" err="1">
+                <a:latin typeface="Consolas" panose="020B0609020204030204" pitchFamily="49" charset="0"/>
+              </a:rPr>
+              <a:t>Symbol.rightBracket</a:t>
+            </a:r>
+            <a:r>
+              <a:rPr lang="en-US" sz="1800" dirty="0">
+                <a:latin typeface="Consolas" panose="020B0609020204030204" pitchFamily="49" charset="0"/>
+              </a:rPr>
+              <a:t>);</a:t>
+            </a:r>
+          </a:p>
+          <a:p>
+            <a:pPr marL="91440" indent="0">
+              <a:spcBef>
+                <a:spcPts val="100"/>
+              </a:spcBef>
+              <a:buNone/>
+            </a:pPr>
+            <a:r>
+              <a:rPr lang="en-US" sz="1800" dirty="0">
+                <a:latin typeface="Consolas" panose="020B0609020204030204" pitchFamily="49" charset="0"/>
+              </a:rPr>
+              <a:t>          }</a:t>
+            </a:r>
+          </a:p>
+          <a:p>
+            <a:pPr marL="91440" indent="0">
+              <a:spcBef>
+                <a:spcPts val="100"/>
+              </a:spcBef>
+              <a:buNone/>
+            </a:pPr>
+            <a:r>
+              <a:rPr lang="en-US" sz="1800" dirty="0">
+                <a:latin typeface="Consolas" panose="020B0609020204030204" pitchFamily="49" charset="0"/>
+              </a:rPr>
+              <a:t>        else if (</a:t>
+            </a:r>
+            <a:r>
+              <a:rPr lang="en-US" sz="1800" dirty="0" err="1">
+                <a:latin typeface="Consolas" panose="020B0609020204030204" pitchFamily="49" charset="0"/>
+              </a:rPr>
+              <a:t>scanner.getSymbol</a:t>
+            </a:r>
+            <a:r>
+              <a:rPr lang="en-US" sz="1800" dirty="0">
+                <a:latin typeface="Consolas" panose="020B0609020204030204" pitchFamily="49" charset="0"/>
+              </a:rPr>
+              <a:t>() == Symbol.dot)</a:t>
+            </a:r>
+          </a:p>
+          <a:p>
+            <a:pPr marL="91440" indent="0">
+              <a:spcBef>
+                <a:spcPts val="100"/>
+              </a:spcBef>
+              <a:buNone/>
+            </a:pPr>
+            <a:r>
+              <a:rPr lang="en-US" sz="1800" dirty="0">
+                <a:latin typeface="Consolas" panose="020B0609020204030204" pitchFamily="49" charset="0"/>
+              </a:rPr>
+              <a:t>          {</a:t>
+            </a:r>
+          </a:p>
+          <a:p>
+            <a:pPr marL="91440" indent="0">
+              <a:spcBef>
+                <a:spcPts val="100"/>
+              </a:spcBef>
+              <a:buNone/>
+            </a:pPr>
+            <a:r>
+              <a:rPr lang="en-US" sz="1800" dirty="0">
+                <a:latin typeface="Consolas" panose="020B0609020204030204" pitchFamily="49" charset="0"/>
+              </a:rPr>
+              <a:t>            match(Symbol.dot);</a:t>
+            </a:r>
+          </a:p>
+          <a:p>
+            <a:pPr marL="91440" indent="0">
+              <a:spcBef>
+                <a:spcPts val="100"/>
+              </a:spcBef>
+              <a:buNone/>
+            </a:pPr>
+            <a:r>
+              <a:rPr lang="en-US" sz="1800" dirty="0">
+                <a:latin typeface="Consolas" panose="020B0609020204030204" pitchFamily="49" charset="0"/>
+              </a:rPr>
+              <a:t>            match(</a:t>
+            </a:r>
+            <a:r>
+              <a:rPr lang="en-US" sz="1800" dirty="0" err="1">
+                <a:latin typeface="Consolas" panose="020B0609020204030204" pitchFamily="49" charset="0"/>
+              </a:rPr>
+              <a:t>Symbol.identifier</a:t>
+            </a:r>
+            <a:r>
+              <a:rPr lang="en-US" sz="1800" dirty="0">
+                <a:latin typeface="Consolas" panose="020B0609020204030204" pitchFamily="49" charset="0"/>
+              </a:rPr>
+              <a:t>);</a:t>
+            </a:r>
+          </a:p>
+          <a:p>
+            <a:pPr marL="91440" indent="0">
+              <a:spcBef>
+                <a:spcPts val="100"/>
+              </a:spcBef>
+              <a:buNone/>
+            </a:pPr>
+            <a:r>
+              <a:rPr lang="en-US" sz="1800" dirty="0">
+                <a:latin typeface="Consolas" panose="020B0609020204030204" pitchFamily="49" charset="0"/>
+              </a:rPr>
+              <a:t>          }</a:t>
             </a:r>
           </a:p>
           <a:p>

</xml_diff>

<commit_message>
minor improvements to several PowerPoint slides
</commit_message>
<xml_diff>
--- a/PowerPoints/06 - Syntax Analysis.pptx
+++ b/PowerPoints/06 - Syntax Analysis.pptx
@@ -12901,14 +12901,7 @@
           <a:p>
             <a:r>
               <a:rPr lang="en-US" dirty="0"/>
-              <a:t>Example: Recursive Descent Parsing</a:t>
-            </a:r>
-            <a:br>
-              <a:rPr lang="en-US" dirty="0"/>
-            </a:br>
-            <a:r>
-              <a:rPr lang="en-US" dirty="0"/>
-              <a:t>Refinement 2</a:t>
+              <a:t>Example: Parsing Guideline 2</a:t>
             </a:r>
           </a:p>
         </p:txBody>
@@ -18842,8 +18835,19 @@
                 <a:latin typeface="Consolas" pitchFamily="49" charset="0"/>
                 <a:cs typeface="Consolas" pitchFamily="49" charset="0"/>
               </a:rPr>
-              <a:t>     || this == writer</a:t>
-            </a:r>
+              <a:t>     || this == </a:t>
+            </a:r>
+            <a:r>
+              <a:rPr lang="en-US" sz="1800">
+                <a:latin typeface="Consolas" pitchFamily="49" charset="0"/>
+                <a:cs typeface="Consolas" pitchFamily="49" charset="0"/>
+              </a:rPr>
+              <a:t>writeRW</a:t>
+            </a:r>
+            <a:endParaRPr lang="en-US" sz="1800" dirty="0">
+              <a:latin typeface="Consolas" pitchFamily="49" charset="0"/>
+              <a:cs typeface="Consolas" pitchFamily="49" charset="0"/>
+            </a:endParaRPr>
           </a:p>
           <a:p>
             <a:pPr marL="0" indent="0">
@@ -21175,7 +21179,7 @@
           <a:bodyPr/>
           <a:lstStyle/>
           <a:p>
-            <a:pPr marL="0" indent="0">
+            <a:pPr marL="182880" indent="0">
               <a:spcBef>
                 <a:spcPts val="0"/>
               </a:spcBef>
@@ -21198,7 +21202,7 @@
             </a:endParaRPr>
           </a:p>
           <a:p>
-            <a:pPr marL="0" indent="0">
+            <a:pPr marL="182880" indent="0">
               <a:spcBef>
                 <a:spcPts val="0"/>
               </a:spcBef>
@@ -21212,7 +21216,7 @@
             </a:r>
           </a:p>
           <a:p>
-            <a:pPr marL="0" indent="0">
+            <a:pPr marL="182880" indent="0">
               <a:spcBef>
                 <a:spcPts val="0"/>
               </a:spcBef>
@@ -21226,7 +21230,7 @@
             </a:r>
           </a:p>
           <a:p>
-            <a:pPr marL="0" indent="0">
+            <a:pPr marL="182880" indent="0">
               <a:spcBef>
                 <a:spcPts val="0"/>
               </a:spcBef>
@@ -21240,7 +21244,7 @@
             </a:r>
           </a:p>
           <a:p>
-            <a:pPr marL="0" indent="0">
+            <a:pPr marL="182880" indent="0">
               <a:spcBef>
                 <a:spcPts val="0"/>
               </a:spcBef>
@@ -21254,7 +21258,7 @@
             </a:r>
           </a:p>
           <a:p>
-            <a:pPr marL="0" indent="0">
+            <a:pPr marL="182880" indent="0">
               <a:spcBef>
                 <a:spcPts val="0"/>
               </a:spcBef>
@@ -21268,7 +21272,7 @@
             </a:r>
           </a:p>
           <a:p>
-            <a:pPr marL="0" indent="0">
+            <a:pPr marL="182880" indent="0">
               <a:spcBef>
                 <a:spcPts val="0"/>
               </a:spcBef>
@@ -21282,7 +21286,7 @@
             </a:r>
           </a:p>
           <a:p>
-            <a:pPr marL="0" indent="0">
+            <a:pPr marL="182880" indent="0">
               <a:spcBef>
                 <a:spcPts val="0"/>
               </a:spcBef>
@@ -21308,7 +21312,7 @@
             </a:r>
           </a:p>
           <a:p>
-            <a:pPr marL="0" indent="0">
+            <a:pPr marL="182880" indent="0">
               <a:spcBef>
                 <a:spcPts val="0"/>
               </a:spcBef>
@@ -21322,7 +21326,7 @@
             </a:r>
           </a:p>
           <a:p>
-            <a:pPr marL="0" indent="0">
+            <a:pPr marL="182880" indent="0">
               <a:spcBef>
                 <a:spcPts val="0"/>
               </a:spcBef>
@@ -21333,7 +21337,7 @@
             </a:endParaRPr>
           </a:p>
           <a:p>
-            <a:pPr marL="0" indent="0">
+            <a:pPr marL="182880" indent="0">
               <a:spcBef>
                 <a:spcPts val="0"/>
               </a:spcBef>
@@ -21347,7 +21351,7 @@
             </a:r>
           </a:p>
           <a:p>
-            <a:pPr marL="0" indent="0">
+            <a:pPr marL="182880" indent="0">
               <a:spcBef>
                 <a:spcPts val="0"/>
               </a:spcBef>
@@ -21361,7 +21365,7 @@
             </a:r>
           </a:p>
           <a:p>
-            <a:pPr marL="0" indent="0">
+            <a:pPr marL="182880" indent="0">
               <a:spcBef>
                 <a:spcPts val="0"/>
               </a:spcBef>
@@ -21375,7 +21379,7 @@
             </a:r>
           </a:p>
           <a:p>
-            <a:pPr marL="0" indent="0">
+            <a:pPr marL="182880" indent="0">
               <a:spcBef>
                 <a:spcPts val="0"/>
               </a:spcBef>
@@ -21401,7 +21405,7 @@
             </a:r>
           </a:p>
           <a:p>
-            <a:pPr marL="0" indent="0">
+            <a:pPr marL="182880" indent="0">
               <a:spcBef>
                 <a:spcPts val="0"/>
               </a:spcBef>
@@ -21415,7 +21419,7 @@
             </a:r>
           </a:p>
           <a:p>
-            <a:pPr marL="0" indent="0">
+            <a:pPr marL="182880" indent="0">
               <a:spcBef>
                 <a:spcPts val="0"/>
               </a:spcBef>
@@ -21441,7 +21445,7 @@
             </a:r>
           </a:p>
           <a:p>
-            <a:pPr marL="0" indent="0">
+            <a:pPr marL="182880" indent="0">
               <a:spcBef>
                 <a:spcPts val="0"/>
               </a:spcBef>
@@ -21467,7 +21471,7 @@
             </a:r>
           </a:p>
           <a:p>
-            <a:pPr marL="0" indent="0">
+            <a:pPr marL="182880" indent="0">
               <a:spcBef>
                 <a:spcPts val="0"/>
               </a:spcBef>
@@ -21481,7 +21485,7 @@
             </a:r>
           </a:p>
           <a:p>
-            <a:pPr marL="0" indent="0">
+            <a:pPr marL="182880" indent="0">
               <a:spcBef>
                 <a:spcPts val="0"/>
               </a:spcBef>
@@ -24933,8 +24937,12 @@
           <a:p>
             <a:pPr lvl="1"/>
             <a:r>
-              <a:rPr lang="en-US" dirty="0"/>
-              <a:t>ignore  its parameter</a:t>
+              <a:rPr lang="en-US"/>
+              <a:t>ignore </a:t>
+            </a:r>
+            <a:r>
+              <a:rPr lang="en-US" dirty="0"/>
+              <a:t>its parameter</a:t>
             </a:r>
           </a:p>
           <a:p>
@@ -26080,17 +26088,48 @@
             </a:pPr>
             <a:r>
               <a:rPr lang="en-US" dirty="0"/>
-              <a:t>If the symbol following the identifier is “</a:t>
+              <a:t>In </a:t>
+            </a:r>
+            <a:r>
+              <a:rPr lang="en-US" dirty="0" err="1">
+                <a:latin typeface="Consolas" panose="020B0609020204030204" pitchFamily="49" charset="0"/>
+              </a:rPr>
+              <a:t>parseStatement</a:t>
             </a:r>
             <a:r>
               <a:rPr lang="en-US" dirty="0">
                 <a:latin typeface="Consolas" panose="020B0609020204030204" pitchFamily="49" charset="0"/>
               </a:rPr>
+              <a:t>()</a:t>
+            </a:r>
+            <a:r>
+              <a:rPr lang="en-US" dirty="0"/>
+              <a:t>, if the symbol following the </a:t>
+            </a:r>
+            <a:r>
+              <a:rPr lang="en-US"/>
+              <a:t>identifier is</a:t>
+            </a:r>
+            <a:br>
+              <a:rPr lang="en-US"/>
+            </a:br>
+            <a:r>
+              <a:rPr lang="en-US"/>
+              <a:t>“</a:t>
+            </a:r>
+            <a:r>
+              <a:rPr lang="en-US">
+                <a:latin typeface="Consolas" panose="020B0609020204030204" pitchFamily="49" charset="0"/>
+              </a:rPr>
               <a:t>[</a:t>
             </a:r>
             <a:r>
-              <a:rPr lang="en-US" dirty="0"/>
-              <a:t>”, “</a:t>
+              <a:rPr lang="en-US"/>
+              <a:t>”, </a:t>
+            </a:r>
+            <a:r>
+              <a:rPr lang="en-US" dirty="0"/>
+              <a:t>“</a:t>
             </a:r>
             <a:r>
               <a:rPr lang="en-US" dirty="0">
@@ -28128,7 +28167,21 @@
                 <a:latin typeface="Consolas" pitchFamily="49" charset="0"/>
                 <a:cs typeface="Consolas" pitchFamily="49" charset="0"/>
               </a:rPr>
-              <a:t>    constantId,  variableId, arrayTypeId, </a:t>
+              <a:t>    constantId,   </a:t>
+            </a:r>
+            <a:r>
+              <a:rPr lang="en-US" sz="1800" dirty="0" err="1">
+                <a:latin typeface="Consolas" pitchFamily="49" charset="0"/>
+                <a:cs typeface="Consolas" pitchFamily="49" charset="0"/>
+              </a:rPr>
+              <a:t>variableId</a:t>
+            </a:r>
+            <a:r>
+              <a:rPr lang="en-US" sz="1800" dirty="0">
+                <a:latin typeface="Consolas" pitchFamily="49" charset="0"/>
+                <a:cs typeface="Consolas" pitchFamily="49" charset="0"/>
+              </a:rPr>
+              <a:t>, arrayTypeId, </a:t>
             </a:r>
             <a:r>
               <a:rPr lang="en-US" sz="1800" dirty="0" err="1">
@@ -28171,7 +28224,28 @@
                 <a:latin typeface="Consolas" pitchFamily="49" charset="0"/>
                 <a:cs typeface="Consolas" pitchFamily="49" charset="0"/>
               </a:rPr>
-              <a:t>, procedureId, functionId</a:t>
+              <a:t>, </a:t>
+            </a:r>
+            <a:r>
+              <a:rPr lang="en-US" sz="1800" dirty="0" err="1">
+                <a:latin typeface="Consolas" pitchFamily="49" charset="0"/>
+                <a:cs typeface="Consolas" pitchFamily="49" charset="0"/>
+              </a:rPr>
+              <a:t>fieldId</a:t>
+            </a:r>
+            <a:r>
+              <a:rPr lang="en-US" sz="1800">
+                <a:latin typeface="Consolas" pitchFamily="49" charset="0"/>
+                <a:cs typeface="Consolas" pitchFamily="49" charset="0"/>
+              </a:rPr>
+              <a:t>,    procedureId</a:t>
+            </a:r>
+            <a:r>
+              <a:rPr lang="en-US" sz="1800" dirty="0">
+                <a:latin typeface="Consolas" pitchFamily="49" charset="0"/>
+                <a:cs typeface="Consolas" pitchFamily="49" charset="0"/>
+              </a:rPr>
+              <a:t>, functionId</a:t>
             </a:r>
           </a:p>
           <a:p>

</xml_diff>